<commit_message>
add five new chapters
</commit_message>
<xml_diff>
--- a/ES6 .pptx
+++ b/ES6 .pptx
@@ -5,7 +5,7 @@
     <p:sldMasterId id="2147483731" r:id="rId1"/>
   </p:sldMasterIdLst>
   <p:notesMasterIdLst>
-    <p:notesMasterId r:id="rId15"/>
+    <p:notesMasterId r:id="rId17"/>
   </p:notesMasterIdLst>
   <p:sldIdLst>
     <p:sldId id="256" r:id="rId2"/>
@@ -19,8 +19,10 @@
     <p:sldId id="264" r:id="rId10"/>
     <p:sldId id="265" r:id="rId11"/>
     <p:sldId id="266" r:id="rId12"/>
-    <p:sldId id="267" r:id="rId13"/>
-    <p:sldId id="268" r:id="rId14"/>
+    <p:sldId id="269" r:id="rId13"/>
+    <p:sldId id="267" r:id="rId14"/>
+    <p:sldId id="268" r:id="rId15"/>
+    <p:sldId id="270" r:id="rId16"/>
   </p:sldIdLst>
   <p:sldSz cx="12192000" cy="6858000"/>
   <p:notesSz cx="6858000" cy="9144000"/>
@@ -209,7 +211,7 @@
           <a:p>
             <a:fld id="{84477351-9D00-43BD-B6F7-144CD6118EA8}" type="datetimeFigureOut">
               <a:rPr lang="en-US" smtClean="0"/>
-              <a:t>7/10/2016</a:t>
+              <a:t>7/11/2016</a:t>
             </a:fld>
             <a:endParaRPr lang="en-US"/>
           </a:p>
@@ -818,7 +820,7 @@
           <a:p>
             <a:fld id="{D0EED80F-1B3C-4383-85E0-429967D529E1}" type="datetimeFigureOut">
               <a:rPr lang="en-US" smtClean="0"/>
-              <a:t>7/10/2016</a:t>
+              <a:t>7/11/2016</a:t>
             </a:fld>
             <a:endParaRPr lang="en-US"/>
           </a:p>
@@ -1093,7 +1095,7 @@
           <a:p>
             <a:fld id="{D0EED80F-1B3C-4383-85E0-429967D529E1}" type="datetimeFigureOut">
               <a:rPr lang="en-US" smtClean="0"/>
-              <a:t>7/10/2016</a:t>
+              <a:t>7/11/2016</a:t>
             </a:fld>
             <a:endParaRPr lang="en-US"/>
           </a:p>
@@ -1287,7 +1289,7 @@
           <a:p>
             <a:fld id="{D0EED80F-1B3C-4383-85E0-429967D529E1}" type="datetimeFigureOut">
               <a:rPr lang="en-US" smtClean="0"/>
-              <a:t>7/10/2016</a:t>
+              <a:t>7/11/2016</a:t>
             </a:fld>
             <a:endParaRPr lang="en-US"/>
           </a:p>
@@ -1560,7 +1562,7 @@
           <a:p>
             <a:fld id="{D0EED80F-1B3C-4383-85E0-429967D529E1}" type="datetimeFigureOut">
               <a:rPr lang="en-US" smtClean="0"/>
-              <a:t>7/10/2016</a:t>
+              <a:t>7/11/2016</a:t>
             </a:fld>
             <a:endParaRPr lang="en-US"/>
           </a:p>
@@ -1901,7 +1903,7 @@
           <a:p>
             <a:fld id="{D0EED80F-1B3C-4383-85E0-429967D529E1}" type="datetimeFigureOut">
               <a:rPr lang="en-US" smtClean="0"/>
-              <a:t>7/10/2016</a:t>
+              <a:t>7/11/2016</a:t>
             </a:fld>
             <a:endParaRPr lang="en-US"/>
           </a:p>
@@ -2524,7 +2526,7 @@
           <a:p>
             <a:fld id="{D0EED80F-1B3C-4383-85E0-429967D529E1}" type="datetimeFigureOut">
               <a:rPr lang="en-US" smtClean="0"/>
-              <a:t>7/10/2016</a:t>
+              <a:t>7/11/2016</a:t>
             </a:fld>
             <a:endParaRPr lang="en-US"/>
           </a:p>
@@ -3384,7 +3386,7 @@
           <a:p>
             <a:fld id="{D0EED80F-1B3C-4383-85E0-429967D529E1}" type="datetimeFigureOut">
               <a:rPr lang="en-US" smtClean="0"/>
-              <a:t>7/10/2016</a:t>
+              <a:t>7/11/2016</a:t>
             </a:fld>
             <a:endParaRPr lang="en-US"/>
           </a:p>
@@ -3554,7 +3556,7 @@
           <a:p>
             <a:fld id="{D0EED80F-1B3C-4383-85E0-429967D529E1}" type="datetimeFigureOut">
               <a:rPr lang="en-US" smtClean="0"/>
-              <a:t>7/10/2016</a:t>
+              <a:t>7/11/2016</a:t>
             </a:fld>
             <a:endParaRPr lang="en-US"/>
           </a:p>
@@ -3734,7 +3736,7 @@
           <a:p>
             <a:fld id="{D0EED80F-1B3C-4383-85E0-429967D529E1}" type="datetimeFigureOut">
               <a:rPr lang="en-US" smtClean="0"/>
-              <a:t>7/10/2016</a:t>
+              <a:t>7/11/2016</a:t>
             </a:fld>
             <a:endParaRPr lang="en-US"/>
           </a:p>
@@ -3904,7 +3906,7 @@
           <a:p>
             <a:fld id="{D0EED80F-1B3C-4383-85E0-429967D529E1}" type="datetimeFigureOut">
               <a:rPr lang="en-US" smtClean="0"/>
-              <a:t>7/10/2016</a:t>
+              <a:t>7/11/2016</a:t>
             </a:fld>
             <a:endParaRPr lang="en-US"/>
           </a:p>
@@ -4151,7 +4153,7 @@
           <a:p>
             <a:fld id="{D0EED80F-1B3C-4383-85E0-429967D529E1}" type="datetimeFigureOut">
               <a:rPr lang="en-US" smtClean="0"/>
-              <a:t>7/10/2016</a:t>
+              <a:t>7/11/2016</a:t>
             </a:fld>
             <a:endParaRPr lang="en-US"/>
           </a:p>
@@ -4443,7 +4445,7 @@
           <a:p>
             <a:fld id="{D0EED80F-1B3C-4383-85E0-429967D529E1}" type="datetimeFigureOut">
               <a:rPr lang="en-US" smtClean="0"/>
-              <a:t>7/10/2016</a:t>
+              <a:t>7/11/2016</a:t>
             </a:fld>
             <a:endParaRPr lang="en-US"/>
           </a:p>
@@ -4887,7 +4889,7 @@
           <a:p>
             <a:fld id="{D0EED80F-1B3C-4383-85E0-429967D529E1}" type="datetimeFigureOut">
               <a:rPr lang="en-US" smtClean="0"/>
-              <a:t>7/10/2016</a:t>
+              <a:t>7/11/2016</a:t>
             </a:fld>
             <a:endParaRPr lang="en-US"/>
           </a:p>
@@ -5005,7 +5007,7 @@
           <a:p>
             <a:fld id="{D0EED80F-1B3C-4383-85E0-429967D529E1}" type="datetimeFigureOut">
               <a:rPr lang="en-US" smtClean="0"/>
-              <a:t>7/10/2016</a:t>
+              <a:t>7/11/2016</a:t>
             </a:fld>
             <a:endParaRPr lang="en-US"/>
           </a:p>
@@ -5100,7 +5102,7 @@
           <a:p>
             <a:fld id="{D0EED80F-1B3C-4383-85E0-429967D529E1}" type="datetimeFigureOut">
               <a:rPr lang="en-US" smtClean="0"/>
-              <a:t>7/10/2016</a:t>
+              <a:t>7/11/2016</a:t>
             </a:fld>
             <a:endParaRPr lang="en-US"/>
           </a:p>
@@ -5379,7 +5381,7 @@
           <a:p>
             <a:fld id="{D0EED80F-1B3C-4383-85E0-429967D529E1}" type="datetimeFigureOut">
               <a:rPr lang="en-US" smtClean="0"/>
-              <a:t>7/10/2016</a:t>
+              <a:t>7/11/2016</a:t>
             </a:fld>
             <a:endParaRPr lang="en-US"/>
           </a:p>
@@ -5654,7 +5656,7 @@
           <a:p>
             <a:fld id="{D0EED80F-1B3C-4383-85E0-429967D529E1}" type="datetimeFigureOut">
               <a:rPr lang="en-US" smtClean="0"/>
-              <a:t>7/10/2016</a:t>
+              <a:t>7/11/2016</a:t>
             </a:fld>
             <a:endParaRPr lang="en-US"/>
           </a:p>
@@ -6083,7 +6085,7 @@
           <a:p>
             <a:fld id="{D0EED80F-1B3C-4383-85E0-429967D529E1}" type="datetimeFigureOut">
               <a:rPr lang="en-US" smtClean="0"/>
-              <a:t>7/10/2016</a:t>
+              <a:t>7/11/2016</a:t>
             </a:fld>
             <a:endParaRPr lang="en-US"/>
           </a:p>
@@ -6736,6 +6738,86 @@
           <a:bodyPr/>
           <a:lstStyle/>
           <a:p>
+            <a:r>
+              <a:rPr lang="en-US" dirty="0" err="1"/>
+              <a:t>Array.from</a:t>
+            </a:r>
+            <a:r>
+              <a:rPr lang="en-US" dirty="0" smtClean="0"/>
+              <a:t>()</a:t>
+            </a:r>
+          </a:p>
+          <a:p>
+            <a:r>
+              <a:rPr lang="en-US" dirty="0" err="1"/>
+              <a:t>Array.of</a:t>
+            </a:r>
+            <a:r>
+              <a:rPr lang="en-US" dirty="0" smtClean="0"/>
+              <a:t>()</a:t>
+            </a:r>
+          </a:p>
+          <a:p>
+            <a:r>
+              <a:rPr lang="en-US" dirty="0" err="1"/>
+              <a:t>copyWithin</a:t>
+            </a:r>
+            <a:r>
+              <a:rPr lang="en-US" dirty="0" smtClean="0"/>
+              <a:t>()</a:t>
+            </a:r>
+          </a:p>
+          <a:p>
+            <a:r>
+              <a:rPr lang="en-US" dirty="0"/>
+              <a:t>find</a:t>
+            </a:r>
+            <a:r>
+              <a:rPr lang="en-US" dirty="0" smtClean="0"/>
+              <a:t>()\</a:t>
+            </a:r>
+            <a:r>
+              <a:rPr lang="en-US" dirty="0" err="1" smtClean="0"/>
+              <a:t>findIndex</a:t>
+            </a:r>
+            <a:r>
+              <a:rPr lang="en-US" dirty="0" smtClean="0"/>
+              <a:t>()</a:t>
+            </a:r>
+          </a:p>
+          <a:p>
+            <a:r>
+              <a:rPr lang="en-US" dirty="0"/>
+              <a:t>fill</a:t>
+            </a:r>
+            <a:r>
+              <a:rPr lang="en-US" dirty="0" smtClean="0"/>
+              <a:t>()</a:t>
+            </a:r>
+          </a:p>
+          <a:p>
+            <a:r>
+              <a:rPr lang="en-US" dirty="0"/>
+              <a:t>Map : entries()，keys()</a:t>
+            </a:r>
+            <a:r>
+              <a:rPr lang="zh-CN" altLang="en-US" dirty="0"/>
+              <a:t>和</a:t>
+            </a:r>
+            <a:r>
+              <a:rPr lang="en-US" dirty="0"/>
+              <a:t>values</a:t>
+            </a:r>
+            <a:r>
+              <a:rPr lang="en-US" dirty="0" smtClean="0"/>
+              <a:t>()</a:t>
+            </a:r>
+          </a:p>
+          <a:p>
+            <a:r>
+              <a:rPr lang="en-US" dirty="0"/>
+              <a:t>includes()</a:t>
+            </a:r>
             <a:endParaRPr lang="en-US" dirty="0"/>
           </a:p>
         </p:txBody>
@@ -6798,7 +6880,15 @@
             </a:r>
             <a:r>
               <a:rPr lang="zh-CN" altLang="en-US" dirty="0" smtClean="0"/>
-              <a:t>函数的扩展</a:t>
+              <a:t>函数的</a:t>
+            </a:r>
+            <a:r>
+              <a:rPr lang="zh-CN" altLang="en-US" dirty="0" smtClean="0"/>
+              <a:t>扩展</a:t>
+            </a:r>
+            <a:r>
+              <a:rPr lang="en-US" altLang="zh-CN" dirty="0" smtClean="0"/>
+              <a:t>(1)</a:t>
             </a:r>
             <a:endParaRPr lang="en-US" dirty="0"/>
           </a:p>
@@ -6819,7 +6909,87 @@
           <a:bodyPr/>
           <a:lstStyle/>
           <a:p>
-            <a:endParaRPr lang="en-US"/>
+            <a:r>
+              <a:rPr lang="zh-CN" altLang="en-US" dirty="0"/>
+              <a:t>函数参数的</a:t>
+            </a:r>
+            <a:r>
+              <a:rPr lang="zh-CN" altLang="en-US" dirty="0" smtClean="0"/>
+              <a:t>默认值</a:t>
+            </a:r>
+            <a:endParaRPr lang="en-US" altLang="zh-CN" dirty="0" smtClean="0"/>
+          </a:p>
+          <a:p>
+            <a:pPr lvl="1"/>
+            <a:r>
+              <a:rPr lang="zh-CN" altLang="en-US" dirty="0" smtClean="0"/>
+              <a:t>基本用法</a:t>
+            </a:r>
+            <a:endParaRPr lang="en-US" altLang="zh-CN" dirty="0" smtClean="0"/>
+          </a:p>
+          <a:p>
+            <a:pPr lvl="1"/>
+            <a:r>
+              <a:rPr lang="zh-CN" altLang="en-US" dirty="0" smtClean="0"/>
+              <a:t>与解构赋值结合使用</a:t>
+            </a:r>
+            <a:endParaRPr lang="en-US" altLang="zh-CN" dirty="0" smtClean="0"/>
+          </a:p>
+          <a:p>
+            <a:pPr lvl="1"/>
+            <a:r>
+              <a:rPr lang="zh-CN" altLang="en-US" dirty="0" smtClean="0"/>
+              <a:t>参数位置</a:t>
+            </a:r>
+            <a:endParaRPr lang="en-US" altLang="zh-CN" dirty="0" smtClean="0"/>
+          </a:p>
+          <a:p>
+            <a:pPr lvl="1"/>
+            <a:r>
+              <a:rPr lang="en-US" dirty="0" smtClean="0"/>
+              <a:t>Length</a:t>
+            </a:r>
+            <a:r>
+              <a:rPr lang="zh-CN" altLang="en-US" dirty="0" smtClean="0"/>
+              <a:t>属性</a:t>
+            </a:r>
+            <a:endParaRPr lang="en-US" altLang="zh-CN" dirty="0" smtClean="0"/>
+          </a:p>
+          <a:p>
+            <a:r>
+              <a:rPr lang="en-US" dirty="0" smtClean="0"/>
+              <a:t>Rest</a:t>
+            </a:r>
+            <a:r>
+              <a:rPr lang="zh-CN" altLang="en-US" dirty="0" smtClean="0"/>
+              <a:t>参数</a:t>
+            </a:r>
+            <a:endParaRPr lang="en-US" altLang="zh-CN" dirty="0" smtClean="0"/>
+          </a:p>
+          <a:p>
+            <a:r>
+              <a:rPr lang="zh-CN" altLang="en-US" dirty="0" smtClean="0"/>
+              <a:t>扩展运算符</a:t>
+            </a:r>
+            <a:endParaRPr lang="en-US" altLang="zh-CN" dirty="0" smtClean="0"/>
+          </a:p>
+          <a:p>
+            <a:r>
+              <a:rPr lang="en-US" altLang="zh-CN" dirty="0" smtClean="0"/>
+              <a:t>Name</a:t>
+            </a:r>
+            <a:r>
+              <a:rPr lang="zh-CN" altLang="en-US" dirty="0" smtClean="0"/>
+              <a:t>属性</a:t>
+            </a:r>
+            <a:endParaRPr lang="en-US" altLang="zh-CN" dirty="0" smtClean="0"/>
+          </a:p>
+          <a:p>
+            <a:r>
+              <a:rPr lang="zh-CN" altLang="en-US" dirty="0" smtClean="0"/>
+              <a:t>箭头函数</a:t>
+            </a:r>
+            <a:endParaRPr lang="en-US" dirty="0"/>
           </a:p>
         </p:txBody>
       </p:sp>
@@ -6876,12 +7046,20 @@
           <a:lstStyle/>
           <a:p>
             <a:r>
+              <a:rPr lang="en-US" altLang="zh-CN" dirty="0"/>
+              <a:t>7. </a:t>
+            </a:r>
+            <a:r>
+              <a:rPr lang="zh-CN" altLang="en-US" dirty="0"/>
+              <a:t>函数的</a:t>
+            </a:r>
+            <a:r>
+              <a:rPr lang="zh-CN" altLang="en-US" dirty="0" smtClean="0"/>
+              <a:t>扩展</a:t>
+            </a:r>
+            <a:r>
               <a:rPr lang="en-US" altLang="zh-CN" dirty="0" smtClean="0"/>
-              <a:t>8. </a:t>
-            </a:r>
-            <a:r>
-              <a:rPr lang="zh-CN" altLang="en-US" dirty="0" smtClean="0"/>
-              <a:t>对象的扩展</a:t>
+              <a:t>(2)</a:t>
             </a:r>
             <a:endParaRPr lang="en-US" dirty="0"/>
           </a:p>
@@ -6902,14 +7080,25 @@
           <a:bodyPr/>
           <a:lstStyle/>
           <a:p>
-            <a:endParaRPr lang="en-US"/>
+            <a:r>
+              <a:rPr lang="zh-CN" altLang="en-US" dirty="0" smtClean="0"/>
+              <a:t>函数绑定</a:t>
+            </a:r>
+            <a:endParaRPr lang="en-US" altLang="zh-CN" dirty="0" smtClean="0"/>
+          </a:p>
+          <a:p>
+            <a:r>
+              <a:rPr lang="zh-CN" altLang="en-US" dirty="0" smtClean="0"/>
+              <a:t>尾调用优化</a:t>
+            </a:r>
+            <a:endParaRPr lang="en-US" dirty="0"/>
           </a:p>
         </p:txBody>
       </p:sp>
     </p:spTree>
     <p:extLst>
       <p:ext uri="{BB962C8B-B14F-4D97-AF65-F5344CB8AC3E}">
-        <p14:creationId xmlns:p14="http://schemas.microsoft.com/office/powerpoint/2010/main" val="2075595602"/>
+        <p14:creationId xmlns:p14="http://schemas.microsoft.com/office/powerpoint/2010/main" val="4027641565"/>
       </p:ext>
     </p:extLst>
   </p:cSld>
@@ -6959,6 +7148,142 @@
           <a:lstStyle/>
           <a:p>
             <a:r>
+              <a:rPr lang="en-US" altLang="zh-CN" dirty="0" smtClean="0"/>
+              <a:t>8. </a:t>
+            </a:r>
+            <a:r>
+              <a:rPr lang="zh-CN" altLang="en-US" dirty="0" smtClean="0"/>
+              <a:t>对象的扩展</a:t>
+            </a:r>
+            <a:endParaRPr lang="en-US" dirty="0"/>
+          </a:p>
+        </p:txBody>
+      </p:sp>
+      <p:sp>
+        <p:nvSpPr>
+          <p:cNvPr id="3" name="内容占位符 2"/>
+          <p:cNvSpPr>
+            <a:spLocks noGrp="1"/>
+          </p:cNvSpPr>
+          <p:nvPr>
+            <p:ph idx="1"/>
+          </p:nvPr>
+        </p:nvSpPr>
+        <p:spPr/>
+        <p:txBody>
+          <a:bodyPr/>
+          <a:lstStyle/>
+          <a:p>
+            <a:r>
+              <a:rPr lang="zh-CN" altLang="en-US" dirty="0"/>
+              <a:t>属性的简洁表示</a:t>
+            </a:r>
+            <a:r>
+              <a:rPr lang="zh-CN" altLang="en-US" dirty="0" smtClean="0"/>
+              <a:t>法</a:t>
+            </a:r>
+            <a:endParaRPr lang="en-US" altLang="zh-CN" dirty="0" smtClean="0"/>
+          </a:p>
+          <a:p>
+            <a:r>
+              <a:rPr lang="zh-CN" altLang="en-US" dirty="0"/>
+              <a:t>属性</a:t>
+            </a:r>
+            <a:r>
+              <a:rPr lang="zh-CN" altLang="en-US" dirty="0" smtClean="0"/>
+              <a:t>名</a:t>
+            </a:r>
+            <a:endParaRPr lang="en-US" altLang="zh-CN" dirty="0" smtClean="0"/>
+          </a:p>
+          <a:p>
+            <a:r>
+              <a:rPr lang="en-US" altLang="zh-CN" dirty="0"/>
+              <a:t>name</a:t>
+            </a:r>
+            <a:r>
+              <a:rPr lang="zh-CN" altLang="en-US" dirty="0" smtClean="0"/>
+              <a:t>属性表达式</a:t>
+            </a:r>
+            <a:endParaRPr lang="en-US" altLang="zh-CN" dirty="0" smtClean="0"/>
+          </a:p>
+          <a:p>
+            <a:r>
+              <a:rPr lang="en-US" dirty="0" smtClean="0"/>
+              <a:t>Object.is()</a:t>
+            </a:r>
+          </a:p>
+          <a:p>
+            <a:r>
+              <a:rPr lang="en-US" dirty="0" err="1"/>
+              <a:t>Object.assign</a:t>
+            </a:r>
+            <a:r>
+              <a:rPr lang="en-US" dirty="0" smtClean="0"/>
+              <a:t>()</a:t>
+            </a:r>
+          </a:p>
+          <a:p>
+            <a:r>
+              <a:rPr lang="zh-CN" altLang="en-US" dirty="0"/>
+              <a:t>属性的可枚举性</a:t>
+            </a:r>
+            <a:endParaRPr lang="en-US" dirty="0"/>
+          </a:p>
+        </p:txBody>
+      </p:sp>
+    </p:spTree>
+    <p:extLst>
+      <p:ext uri="{BB962C8B-B14F-4D97-AF65-F5344CB8AC3E}">
+        <p14:creationId xmlns:p14="http://schemas.microsoft.com/office/powerpoint/2010/main" val="2075595602"/>
+      </p:ext>
+    </p:extLst>
+  </p:cSld>
+  <p:clrMapOvr>
+    <a:masterClrMapping/>
+  </p:clrMapOvr>
+  <p:timing>
+    <p:tnLst>
+      <p:par>
+        <p:cTn id="1" dur="indefinite" restart="never" nodeType="tmRoot"/>
+      </p:par>
+    </p:tnLst>
+  </p:timing>
+</p:sld>
+</file>
+
+<file path=ppt/slides/slide14.xml><?xml version="1.0" encoding="utf-8"?>
+<p:sld xmlns:a="http://schemas.openxmlformats.org/drawingml/2006/main" xmlns:r="http://schemas.openxmlformats.org/officeDocument/2006/relationships" xmlns:p="http://schemas.openxmlformats.org/presentationml/2006/main">
+  <p:cSld>
+    <p:spTree>
+      <p:nvGrpSpPr>
+        <p:cNvPr id="1" name=""/>
+        <p:cNvGrpSpPr/>
+        <p:nvPr/>
+      </p:nvGrpSpPr>
+      <p:grpSpPr>
+        <a:xfrm>
+          <a:off x="0" y="0"/>
+          <a:ext cx="0" cy="0"/>
+          <a:chOff x="0" y="0"/>
+          <a:chExt cx="0" cy="0"/>
+        </a:xfrm>
+      </p:grpSpPr>
+      <p:sp>
+        <p:nvSpPr>
+          <p:cNvPr id="2" name="标题 1"/>
+          <p:cNvSpPr>
+            <a:spLocks noGrp="1"/>
+          </p:cNvSpPr>
+          <p:nvPr>
+            <p:ph type="title"/>
+          </p:nvPr>
+        </p:nvSpPr>
+        <p:spPr/>
+        <p:txBody>
+          <a:bodyPr/>
+          <a:lstStyle/>
+          <a:p>
+            <a:r>
               <a:rPr lang="en-US" dirty="0" smtClean="0"/>
               <a:t>9. Symbol</a:t>
             </a:r>
@@ -6981,6 +7306,89 @@
           <a:bodyPr/>
           <a:lstStyle/>
           <a:p>
+            <a:r>
+              <a:rPr lang="en-US" dirty="0"/>
+              <a:t>ES6</a:t>
+            </a:r>
+            <a:r>
+              <a:rPr lang="zh-CN" altLang="en-US" dirty="0"/>
+              <a:t>引入了一种新的原始数据类型</a:t>
+            </a:r>
+            <a:r>
+              <a:rPr lang="en-US" dirty="0"/>
+              <a:t>Symbol，</a:t>
+            </a:r>
+            <a:r>
+              <a:rPr lang="zh-CN" altLang="en-US" dirty="0"/>
+              <a:t>表示独一无二的</a:t>
+            </a:r>
+            <a:r>
+              <a:rPr lang="zh-CN" altLang="en-US" dirty="0" smtClean="0"/>
+              <a:t>值</a:t>
+            </a:r>
+            <a:endParaRPr lang="en-US" altLang="zh-CN" dirty="0" smtClean="0"/>
+          </a:p>
+          <a:p>
+            <a:r>
+              <a:rPr lang="zh-CN" altLang="en-US" dirty="0"/>
+              <a:t>可以用于定义一组常量，保证这组常量的值都是不相等</a:t>
+            </a:r>
+            <a:r>
+              <a:rPr lang="zh-CN" altLang="en-US" dirty="0" smtClean="0"/>
+              <a:t>的</a:t>
+            </a:r>
+            <a:endParaRPr lang="en-US" altLang="zh-CN" dirty="0" smtClean="0"/>
+          </a:p>
+          <a:p>
+            <a:r>
+              <a:rPr lang="zh-CN" altLang="en-US" dirty="0"/>
+              <a:t>属性名的</a:t>
+            </a:r>
+            <a:r>
+              <a:rPr lang="zh-CN" altLang="en-US" dirty="0" smtClean="0"/>
+              <a:t>遍历 </a:t>
+            </a:r>
+            <a:r>
+              <a:rPr lang="en-US" altLang="zh-CN" dirty="0"/>
+              <a:t>-- </a:t>
+            </a:r>
+            <a:r>
+              <a:rPr lang="en-US" altLang="zh-CN" dirty="0" err="1" smtClean="0"/>
+              <a:t>Object.getOwnPropertySymbols</a:t>
+            </a:r>
+            <a:endParaRPr lang="en-US" altLang="zh-CN" dirty="0" smtClean="0"/>
+          </a:p>
+          <a:p>
+            <a:r>
+              <a:rPr lang="en-US" dirty="0" err="1"/>
+              <a:t>Symbol.for</a:t>
+            </a:r>
+            <a:r>
+              <a:rPr lang="en-US" dirty="0"/>
+              <a:t>()，</a:t>
+            </a:r>
+            <a:r>
+              <a:rPr lang="en-US" dirty="0" err="1"/>
+              <a:t>Symbol.keyFor</a:t>
+            </a:r>
+            <a:r>
+              <a:rPr lang="en-US" dirty="0" smtClean="0"/>
+              <a:t>()</a:t>
+            </a:r>
+          </a:p>
+          <a:p>
+            <a:r>
+              <a:rPr lang="zh-CN" altLang="en-US" dirty="0"/>
+              <a:t>内置的</a:t>
+            </a:r>
+            <a:r>
+              <a:rPr lang="en-US" dirty="0"/>
+              <a:t>Symbol</a:t>
+            </a:r>
+            <a:r>
+              <a:rPr lang="zh-CN" altLang="en-US"/>
+              <a:t>值</a:t>
+            </a:r>
             <a:endParaRPr lang="en-US"/>
           </a:p>
         </p:txBody>
@@ -6989,6 +7397,160 @@
     <p:extLst>
       <p:ext uri="{BB962C8B-B14F-4D97-AF65-F5344CB8AC3E}">
         <p14:creationId xmlns:p14="http://schemas.microsoft.com/office/powerpoint/2010/main" val="91802410"/>
+      </p:ext>
+    </p:extLst>
+  </p:cSld>
+  <p:clrMapOvr>
+    <a:masterClrMapping/>
+  </p:clrMapOvr>
+  <p:timing>
+    <p:tnLst>
+      <p:par>
+        <p:cTn id="1" dur="indefinite" restart="never" nodeType="tmRoot"/>
+      </p:par>
+    </p:tnLst>
+  </p:timing>
+</p:sld>
+</file>
+
+<file path=ppt/slides/slide15.xml><?xml version="1.0" encoding="utf-8"?>
+<p:sld xmlns:a="http://schemas.openxmlformats.org/drawingml/2006/main" xmlns:r="http://schemas.openxmlformats.org/officeDocument/2006/relationships" xmlns:p="http://schemas.openxmlformats.org/presentationml/2006/main">
+  <p:cSld>
+    <p:spTree>
+      <p:nvGrpSpPr>
+        <p:cNvPr id="1" name=""/>
+        <p:cNvGrpSpPr/>
+        <p:nvPr/>
+      </p:nvGrpSpPr>
+      <p:grpSpPr>
+        <a:xfrm>
+          <a:off x="0" y="0"/>
+          <a:ext cx="0" cy="0"/>
+          <a:chOff x="0" y="0"/>
+          <a:chExt cx="0" cy="0"/>
+        </a:xfrm>
+      </p:grpSpPr>
+      <p:sp>
+        <p:nvSpPr>
+          <p:cNvPr id="2" name="标题 1"/>
+          <p:cNvSpPr>
+            <a:spLocks noGrp="1"/>
+          </p:cNvSpPr>
+          <p:nvPr>
+            <p:ph type="title"/>
+          </p:nvPr>
+        </p:nvSpPr>
+        <p:spPr>
+          <a:xfrm>
+            <a:off x="3128054" y="2060454"/>
+            <a:ext cx="4227339" cy="2441208"/>
+          </a:xfrm>
+          <a:effectLst>
+            <a:glow rad="228600">
+              <a:schemeClr val="accent3">
+                <a:satMod val="175000"/>
+                <a:alpha val="40000"/>
+              </a:schemeClr>
+            </a:glow>
+          </a:effectLst>
+        </p:spPr>
+        <p:txBody>
+          <a:bodyPr/>
+          <a:lstStyle/>
+          <a:p>
+            <a:r>
+              <a:rPr lang="zh-CN" altLang="en-US" dirty="0" smtClean="0">
+                <a:effectLst>
+                  <a:glow rad="101600">
+                    <a:schemeClr val="accent1">
+                      <a:satMod val="175000"/>
+                      <a:alpha val="40000"/>
+                    </a:schemeClr>
+                  </a:glow>
+                </a:effectLst>
+              </a:rPr>
+              <a:t>谢谢大家光临！</a:t>
+            </a:r>
+            <a:r>
+              <a:rPr lang="en-US" altLang="zh-CN" dirty="0" smtClean="0">
+                <a:effectLst>
+                  <a:glow rad="101600">
+                    <a:schemeClr val="accent1">
+                      <a:satMod val="175000"/>
+                      <a:alpha val="40000"/>
+                    </a:schemeClr>
+                  </a:glow>
+                </a:effectLst>
+              </a:rPr>
+              <a:t/>
+            </a:r>
+            <a:br>
+              <a:rPr lang="en-US" altLang="zh-CN" dirty="0" smtClean="0">
+                <a:effectLst>
+                  <a:glow rad="101600">
+                    <a:schemeClr val="accent1">
+                      <a:satMod val="175000"/>
+                      <a:alpha val="40000"/>
+                    </a:schemeClr>
+                  </a:glow>
+                </a:effectLst>
+              </a:rPr>
+            </a:br>
+            <a:r>
+              <a:rPr lang="en-US" altLang="zh-CN" dirty="0" smtClean="0">
+                <a:effectLst>
+                  <a:glow rad="101600">
+                    <a:schemeClr val="accent1">
+                      <a:satMod val="175000"/>
+                      <a:alpha val="40000"/>
+                    </a:schemeClr>
+                  </a:glow>
+                </a:effectLst>
+              </a:rPr>
+              <a:t/>
+            </a:r>
+            <a:br>
+              <a:rPr lang="en-US" altLang="zh-CN" dirty="0" smtClean="0">
+                <a:effectLst>
+                  <a:glow rad="101600">
+                    <a:schemeClr val="accent1">
+                      <a:satMod val="175000"/>
+                      <a:alpha val="40000"/>
+                    </a:schemeClr>
+                  </a:glow>
+                </a:effectLst>
+              </a:rPr>
+            </a:br>
+            <a:r>
+              <a:rPr lang="zh-CN" altLang="en-US" dirty="0" smtClean="0">
+                <a:effectLst>
+                  <a:glow rad="101600">
+                    <a:schemeClr val="accent1">
+                      <a:satMod val="175000"/>
+                      <a:alpha val="40000"/>
+                    </a:schemeClr>
+                  </a:glow>
+                </a:effectLst>
+              </a:rPr>
+              <a:t>有问题请提问</a:t>
+            </a:r>
+            <a:endParaRPr lang="en-US" dirty="0">
+              <a:effectLst>
+                <a:glow rad="101600">
+                  <a:schemeClr val="accent1">
+                    <a:satMod val="175000"/>
+                    <a:alpha val="40000"/>
+                  </a:schemeClr>
+                </a:glow>
+              </a:effectLst>
+            </a:endParaRPr>
+          </a:p>
+        </p:txBody>
+      </p:sp>
+    </p:spTree>
+    <p:extLst>
+      <p:ext uri="{BB962C8B-B14F-4D97-AF65-F5344CB8AC3E}">
+        <p14:creationId xmlns:p14="http://schemas.microsoft.com/office/powerpoint/2010/main" val="1619605932"/>
       </p:ext>
     </p:extLst>
   </p:cSld>
@@ -8022,11 +8584,7 @@
           <a:p>
             <a:r>
               <a:rPr lang="zh-CN" altLang="en-US" dirty="0" smtClean="0"/>
-              <a:t>块级</a:t>
-            </a:r>
-            <a:r>
-              <a:rPr lang="zh-CN" altLang="en-US" dirty="0" smtClean="0"/>
-              <a:t>作用域</a:t>
+              <a:t>块级作用域</a:t>
             </a:r>
             <a:endParaRPr lang="en-US" altLang="zh-CN" dirty="0" smtClean="0"/>
           </a:p>
@@ -8506,7 +9064,6 @@
               <a:rPr lang="en-US" dirty="0"/>
               <a:t>()</a:t>
             </a:r>
-            <a:endParaRPr lang="en-US" dirty="0"/>
           </a:p>
         </p:txBody>
       </p:sp>
@@ -8623,19 +9180,19 @@
           <a:p>
             <a:r>
               <a:rPr lang="zh-CN" altLang="en-US" dirty="0" smtClean="0"/>
-              <a:t>主要</a:t>
-            </a:r>
-            <a:r>
-              <a:rPr lang="zh-CN" altLang="en-US" dirty="0" smtClean="0"/>
-              <a:t>解决的</a:t>
-            </a:r>
-            <a:r>
-              <a:rPr lang="zh-CN" altLang="en-US" dirty="0" smtClean="0"/>
-              <a:t>还是</a:t>
-            </a:r>
-            <a:r>
-              <a:rPr lang="zh-CN" altLang="en-US" dirty="0" smtClean="0"/>
-              <a:t>精度上的问题</a:t>
+              <a:t>面向工程化，解决安全性和</a:t>
+            </a:r>
+            <a:r>
+              <a:rPr lang="zh-CN" altLang="en-US" dirty="0" smtClean="0"/>
+              <a:t>精度上</a:t>
+            </a:r>
+            <a:r>
+              <a:rPr lang="zh-CN" altLang="en-US" dirty="0" smtClean="0"/>
+              <a:t>的</a:t>
+            </a:r>
+            <a:r>
+              <a:rPr lang="zh-CN" altLang="en-US" dirty="0" smtClean="0"/>
+              <a:t>问题，使用时现查</a:t>
             </a:r>
             <a:endParaRPr lang="en-US" dirty="0"/>
           </a:p>

</xml_diff>

<commit_message>
update async and module
</commit_message>
<xml_diff>
--- a/ES6 .pptx
+++ b/ES6 .pptx
@@ -5,7 +5,7 @@
     <p:sldMasterId id="2147483731" r:id="rId1"/>
   </p:sldMasterIdLst>
   <p:notesMasterIdLst>
-    <p:notesMasterId r:id="rId17"/>
+    <p:notesMasterId r:id="rId19"/>
   </p:notesMasterIdLst>
   <p:sldIdLst>
     <p:sldId id="256" r:id="rId2"/>
@@ -22,7 +22,9 @@
     <p:sldId id="269" r:id="rId13"/>
     <p:sldId id="267" r:id="rId14"/>
     <p:sldId id="268" r:id="rId15"/>
-    <p:sldId id="270" r:id="rId16"/>
+    <p:sldId id="271" r:id="rId16"/>
+    <p:sldId id="272" r:id="rId17"/>
+    <p:sldId id="270" r:id="rId18"/>
   </p:sldIdLst>
   <p:sldSz cx="12192000" cy="6858000"/>
   <p:notesSz cx="6858000" cy="9144000"/>
@@ -211,7 +213,7 @@
           <a:p>
             <a:fld id="{84477351-9D00-43BD-B6F7-144CD6118EA8}" type="datetimeFigureOut">
               <a:rPr lang="en-US" smtClean="0"/>
-              <a:t>7/11/2016</a:t>
+              <a:t>7/13/2016</a:t>
             </a:fld>
             <a:endParaRPr lang="en-US"/>
           </a:p>
@@ -820,7 +822,7 @@
           <a:p>
             <a:fld id="{D0EED80F-1B3C-4383-85E0-429967D529E1}" type="datetimeFigureOut">
               <a:rPr lang="en-US" smtClean="0"/>
-              <a:t>7/11/2016</a:t>
+              <a:t>7/13/2016</a:t>
             </a:fld>
             <a:endParaRPr lang="en-US"/>
           </a:p>
@@ -1095,7 +1097,7 @@
           <a:p>
             <a:fld id="{D0EED80F-1B3C-4383-85E0-429967D529E1}" type="datetimeFigureOut">
               <a:rPr lang="en-US" smtClean="0"/>
-              <a:t>7/11/2016</a:t>
+              <a:t>7/13/2016</a:t>
             </a:fld>
             <a:endParaRPr lang="en-US"/>
           </a:p>
@@ -1289,7 +1291,7 @@
           <a:p>
             <a:fld id="{D0EED80F-1B3C-4383-85E0-429967D529E1}" type="datetimeFigureOut">
               <a:rPr lang="en-US" smtClean="0"/>
-              <a:t>7/11/2016</a:t>
+              <a:t>7/13/2016</a:t>
             </a:fld>
             <a:endParaRPr lang="en-US"/>
           </a:p>
@@ -1562,7 +1564,7 @@
           <a:p>
             <a:fld id="{D0EED80F-1B3C-4383-85E0-429967D529E1}" type="datetimeFigureOut">
               <a:rPr lang="en-US" smtClean="0"/>
-              <a:t>7/11/2016</a:t>
+              <a:t>7/13/2016</a:t>
             </a:fld>
             <a:endParaRPr lang="en-US"/>
           </a:p>
@@ -1903,7 +1905,7 @@
           <a:p>
             <a:fld id="{D0EED80F-1B3C-4383-85E0-429967D529E1}" type="datetimeFigureOut">
               <a:rPr lang="en-US" smtClean="0"/>
-              <a:t>7/11/2016</a:t>
+              <a:t>7/13/2016</a:t>
             </a:fld>
             <a:endParaRPr lang="en-US"/>
           </a:p>
@@ -2526,7 +2528,7 @@
           <a:p>
             <a:fld id="{D0EED80F-1B3C-4383-85E0-429967D529E1}" type="datetimeFigureOut">
               <a:rPr lang="en-US" smtClean="0"/>
-              <a:t>7/11/2016</a:t>
+              <a:t>7/13/2016</a:t>
             </a:fld>
             <a:endParaRPr lang="en-US"/>
           </a:p>
@@ -3386,7 +3388,7 @@
           <a:p>
             <a:fld id="{D0EED80F-1B3C-4383-85E0-429967D529E1}" type="datetimeFigureOut">
               <a:rPr lang="en-US" smtClean="0"/>
-              <a:t>7/11/2016</a:t>
+              <a:t>7/13/2016</a:t>
             </a:fld>
             <a:endParaRPr lang="en-US"/>
           </a:p>
@@ -3556,7 +3558,7 @@
           <a:p>
             <a:fld id="{D0EED80F-1B3C-4383-85E0-429967D529E1}" type="datetimeFigureOut">
               <a:rPr lang="en-US" smtClean="0"/>
-              <a:t>7/11/2016</a:t>
+              <a:t>7/13/2016</a:t>
             </a:fld>
             <a:endParaRPr lang="en-US"/>
           </a:p>
@@ -3736,7 +3738,7 @@
           <a:p>
             <a:fld id="{D0EED80F-1B3C-4383-85E0-429967D529E1}" type="datetimeFigureOut">
               <a:rPr lang="en-US" smtClean="0"/>
-              <a:t>7/11/2016</a:t>
+              <a:t>7/13/2016</a:t>
             </a:fld>
             <a:endParaRPr lang="en-US"/>
           </a:p>
@@ -3906,7 +3908,7 @@
           <a:p>
             <a:fld id="{D0EED80F-1B3C-4383-85E0-429967D529E1}" type="datetimeFigureOut">
               <a:rPr lang="en-US" smtClean="0"/>
-              <a:t>7/11/2016</a:t>
+              <a:t>7/13/2016</a:t>
             </a:fld>
             <a:endParaRPr lang="en-US"/>
           </a:p>
@@ -4153,7 +4155,7 @@
           <a:p>
             <a:fld id="{D0EED80F-1B3C-4383-85E0-429967D529E1}" type="datetimeFigureOut">
               <a:rPr lang="en-US" smtClean="0"/>
-              <a:t>7/11/2016</a:t>
+              <a:t>7/13/2016</a:t>
             </a:fld>
             <a:endParaRPr lang="en-US"/>
           </a:p>
@@ -4445,7 +4447,7 @@
           <a:p>
             <a:fld id="{D0EED80F-1B3C-4383-85E0-429967D529E1}" type="datetimeFigureOut">
               <a:rPr lang="en-US" smtClean="0"/>
-              <a:t>7/11/2016</a:t>
+              <a:t>7/13/2016</a:t>
             </a:fld>
             <a:endParaRPr lang="en-US"/>
           </a:p>
@@ -4889,7 +4891,7 @@
           <a:p>
             <a:fld id="{D0EED80F-1B3C-4383-85E0-429967D529E1}" type="datetimeFigureOut">
               <a:rPr lang="en-US" smtClean="0"/>
-              <a:t>7/11/2016</a:t>
+              <a:t>7/13/2016</a:t>
             </a:fld>
             <a:endParaRPr lang="en-US"/>
           </a:p>
@@ -5007,7 +5009,7 @@
           <a:p>
             <a:fld id="{D0EED80F-1B3C-4383-85E0-429967D529E1}" type="datetimeFigureOut">
               <a:rPr lang="en-US" smtClean="0"/>
-              <a:t>7/11/2016</a:t>
+              <a:t>7/13/2016</a:t>
             </a:fld>
             <a:endParaRPr lang="en-US"/>
           </a:p>
@@ -5102,7 +5104,7 @@
           <a:p>
             <a:fld id="{D0EED80F-1B3C-4383-85E0-429967D529E1}" type="datetimeFigureOut">
               <a:rPr lang="en-US" smtClean="0"/>
-              <a:t>7/11/2016</a:t>
+              <a:t>7/13/2016</a:t>
             </a:fld>
             <a:endParaRPr lang="en-US"/>
           </a:p>
@@ -5381,7 +5383,7 @@
           <a:p>
             <a:fld id="{D0EED80F-1B3C-4383-85E0-429967D529E1}" type="datetimeFigureOut">
               <a:rPr lang="en-US" smtClean="0"/>
-              <a:t>7/11/2016</a:t>
+              <a:t>7/13/2016</a:t>
             </a:fld>
             <a:endParaRPr lang="en-US"/>
           </a:p>
@@ -5656,7 +5658,7 @@
           <a:p>
             <a:fld id="{D0EED80F-1B3C-4383-85E0-429967D529E1}" type="datetimeFigureOut">
               <a:rPr lang="en-US" smtClean="0"/>
-              <a:t>7/11/2016</a:t>
+              <a:t>7/13/2016</a:t>
             </a:fld>
             <a:endParaRPr lang="en-US"/>
           </a:p>
@@ -6085,7 +6087,7 @@
           <a:p>
             <a:fld id="{D0EED80F-1B3C-4383-85E0-429967D529E1}" type="datetimeFigureOut">
               <a:rPr lang="en-US" smtClean="0"/>
-              <a:t>7/11/2016</a:t>
+              <a:t>7/13/2016</a:t>
             </a:fld>
             <a:endParaRPr lang="en-US"/>
           </a:p>
@@ -6818,7 +6820,6 @@
               <a:rPr lang="en-US" dirty="0"/>
               <a:t>includes()</a:t>
             </a:r>
-            <a:endParaRPr lang="en-US" dirty="0"/>
           </a:p>
         </p:txBody>
       </p:sp>
@@ -6880,11 +6881,7 @@
             </a:r>
             <a:r>
               <a:rPr lang="zh-CN" altLang="en-US" dirty="0" smtClean="0"/>
-              <a:t>函数的</a:t>
-            </a:r>
-            <a:r>
-              <a:rPr lang="zh-CN" altLang="en-US" dirty="0" smtClean="0"/>
-              <a:t>扩展</a:t>
+              <a:t>函数的扩展</a:t>
             </a:r>
             <a:r>
               <a:rPr lang="en-US" altLang="zh-CN" dirty="0" smtClean="0"/>
@@ -7414,6 +7411,504 @@
 </file>
 
 <file path=ppt/slides/slide15.xml><?xml version="1.0" encoding="utf-8"?>
+<p:sld xmlns:a="http://schemas.openxmlformats.org/drawingml/2006/main" xmlns:r="http://schemas.openxmlformats.org/officeDocument/2006/relationships" xmlns:p="http://schemas.openxmlformats.org/presentationml/2006/main">
+  <p:cSld>
+    <p:spTree>
+      <p:nvGrpSpPr>
+        <p:cNvPr id="1" name=""/>
+        <p:cNvGrpSpPr/>
+        <p:nvPr/>
+      </p:nvGrpSpPr>
+      <p:grpSpPr>
+        <a:xfrm>
+          <a:off x="0" y="0"/>
+          <a:ext cx="0" cy="0"/>
+          <a:chOff x="0" y="0"/>
+          <a:chExt cx="0" cy="0"/>
+        </a:xfrm>
+      </p:grpSpPr>
+      <p:sp>
+        <p:nvSpPr>
+          <p:cNvPr id="2" name="标题 1"/>
+          <p:cNvSpPr>
+            <a:spLocks noGrp="1"/>
+          </p:cNvSpPr>
+          <p:nvPr>
+            <p:ph type="title"/>
+          </p:nvPr>
+        </p:nvSpPr>
+        <p:spPr/>
+        <p:txBody>
+          <a:bodyPr/>
+          <a:lstStyle/>
+          <a:p>
+            <a:r>
+              <a:rPr lang="en-US" altLang="zh-CN" dirty="0" smtClean="0"/>
+              <a:t>16 </a:t>
+            </a:r>
+            <a:r>
+              <a:rPr lang="zh-CN" altLang="en-US" dirty="0" smtClean="0"/>
+              <a:t>异步操作</a:t>
+            </a:r>
+            <a:r>
+              <a:rPr lang="zh-CN" altLang="en-US" dirty="0"/>
+              <a:t>和</a:t>
+            </a:r>
+            <a:r>
+              <a:rPr lang="en-US" altLang="zh-CN" dirty="0" err="1"/>
+              <a:t>async</a:t>
+            </a:r>
+            <a:r>
+              <a:rPr lang="zh-CN" altLang="en-US" dirty="0"/>
+              <a:t>函数</a:t>
+            </a:r>
+            <a:endParaRPr lang="en-US" dirty="0"/>
+          </a:p>
+        </p:txBody>
+      </p:sp>
+      <p:sp>
+        <p:nvSpPr>
+          <p:cNvPr id="3" name="内容占位符 2"/>
+          <p:cNvSpPr>
+            <a:spLocks noGrp="1"/>
+          </p:cNvSpPr>
+          <p:nvPr>
+            <p:ph idx="1"/>
+          </p:nvPr>
+        </p:nvSpPr>
+        <p:spPr>
+          <a:xfrm>
+            <a:off x="1103312" y="1517302"/>
+            <a:ext cx="8946541" cy="4731098"/>
+          </a:xfrm>
+        </p:spPr>
+        <p:txBody>
+          <a:bodyPr>
+            <a:normAutofit fontScale="92500" lnSpcReduction="10000"/>
+          </a:bodyPr>
+          <a:lstStyle/>
+          <a:p>
+            <a:r>
+              <a:rPr lang="zh-CN" altLang="en-US" dirty="0"/>
+              <a:t>异步 回调函</a:t>
+            </a:r>
+            <a:r>
+              <a:rPr lang="zh-CN" altLang="en-US" dirty="0" smtClean="0"/>
+              <a:t>数</a:t>
+            </a:r>
+            <a:endParaRPr lang="en-US" altLang="zh-CN" dirty="0" smtClean="0"/>
+          </a:p>
+          <a:p>
+            <a:r>
+              <a:rPr lang="en-US" dirty="0" smtClean="0"/>
+              <a:t>Promise </a:t>
+            </a:r>
+          </a:p>
+          <a:p>
+            <a:pPr lvl="1"/>
+            <a:r>
+              <a:rPr lang="zh-CN" altLang="en-US" dirty="0" smtClean="0"/>
+              <a:t>允许</a:t>
+            </a:r>
+            <a:r>
+              <a:rPr lang="zh-CN" altLang="en-US" dirty="0"/>
+              <a:t>将回调函数的横向加载，改成纵向</a:t>
+            </a:r>
+            <a:r>
+              <a:rPr lang="zh-CN" altLang="en-US" dirty="0" smtClean="0"/>
+              <a:t>加载</a:t>
+            </a:r>
+            <a:endParaRPr lang="en-US" altLang="zh-CN" dirty="0"/>
+          </a:p>
+          <a:p>
+            <a:r>
+              <a:rPr lang="en-US" dirty="0"/>
+              <a:t>Generator</a:t>
+            </a:r>
+            <a:r>
+              <a:rPr lang="zh-CN" altLang="en-US" dirty="0" smtClean="0"/>
+              <a:t>函数</a:t>
+            </a:r>
+            <a:endParaRPr lang="en-US" altLang="zh-CN" dirty="0" smtClean="0"/>
+          </a:p>
+          <a:p>
+            <a:pPr lvl="1"/>
+            <a:r>
+              <a:rPr lang="zh-CN" altLang="en-US" dirty="0"/>
+              <a:t>异步操作需要暂停的</a:t>
+            </a:r>
+            <a:r>
+              <a:rPr lang="zh-CN" altLang="en-US" dirty="0" smtClean="0"/>
+              <a:t>地方</a:t>
+            </a:r>
+            <a:r>
+              <a:rPr lang="en-US" altLang="zh-CN" dirty="0" smtClean="0"/>
+              <a:t>,</a:t>
+            </a:r>
+            <a:r>
+              <a:rPr lang="zh-CN" altLang="en-US" dirty="0"/>
+              <a:t> 暂停执行和恢复</a:t>
+            </a:r>
+            <a:r>
+              <a:rPr lang="zh-CN" altLang="en-US" dirty="0" smtClean="0"/>
+              <a:t>执行</a:t>
+            </a:r>
+            <a:endParaRPr lang="en-US" altLang="zh-CN" dirty="0" smtClean="0"/>
+          </a:p>
+          <a:p>
+            <a:r>
+              <a:rPr lang="zh-CN" altLang="en-US" dirty="0"/>
+              <a:t>使用 </a:t>
+            </a:r>
+            <a:r>
+              <a:rPr lang="en-US" altLang="zh-CN" dirty="0"/>
+              <a:t>Generator </a:t>
+            </a:r>
+            <a:r>
+              <a:rPr lang="zh-CN" altLang="en-US" dirty="0" smtClean="0"/>
+              <a:t>函数</a:t>
+            </a:r>
+            <a:r>
+              <a:rPr lang="en-US" altLang="zh-CN" dirty="0" smtClean="0"/>
+              <a:t>, </a:t>
+            </a:r>
+            <a:r>
+              <a:rPr lang="zh-CN" altLang="en-US" dirty="0" smtClean="0"/>
+              <a:t>异步</a:t>
+            </a:r>
+            <a:r>
+              <a:rPr lang="zh-CN" altLang="en-US" dirty="0"/>
+              <a:t>任务的</a:t>
+            </a:r>
+            <a:r>
+              <a:rPr lang="zh-CN" altLang="en-US" dirty="0" smtClean="0"/>
+              <a:t>封装</a:t>
+            </a:r>
+            <a:endParaRPr lang="en-US" altLang="zh-CN" dirty="0" smtClean="0"/>
+          </a:p>
+          <a:p>
+            <a:r>
+              <a:rPr lang="en-US" dirty="0" err="1"/>
+              <a:t>Thunk</a:t>
+            </a:r>
+            <a:r>
+              <a:rPr lang="zh-CN" altLang="en-US" dirty="0" smtClean="0"/>
+              <a:t>函数 </a:t>
+            </a:r>
+            <a:r>
+              <a:rPr lang="en-US" altLang="zh-CN" dirty="0" smtClean="0"/>
+              <a:t>-&gt;</a:t>
+            </a:r>
+            <a:r>
+              <a:rPr lang="zh-CN" altLang="en-US" dirty="0" smtClean="0"/>
+              <a:t> </a:t>
+            </a:r>
+            <a:r>
+              <a:rPr lang="en-US" altLang="zh-CN" dirty="0" err="1"/>
+              <a:t>Thunkify</a:t>
+            </a:r>
+            <a:r>
+              <a:rPr lang="zh-CN" altLang="en-US" dirty="0" smtClean="0"/>
+              <a:t>模块</a:t>
+            </a:r>
+            <a:endParaRPr lang="en-US" altLang="zh-CN" dirty="0" smtClean="0"/>
+          </a:p>
+          <a:p>
+            <a:r>
+              <a:rPr lang="en-US" dirty="0" err="1"/>
+              <a:t>Thunk</a:t>
+            </a:r>
+            <a:r>
+              <a:rPr lang="zh-CN" altLang="en-US" dirty="0" smtClean="0"/>
+              <a:t>函数用于</a:t>
+            </a:r>
+            <a:r>
+              <a:rPr lang="en-US" dirty="0"/>
+              <a:t>Generator</a:t>
+            </a:r>
+            <a:r>
+              <a:rPr lang="zh-CN" altLang="en-US" dirty="0"/>
+              <a:t>函数的自动流程</a:t>
+            </a:r>
+            <a:r>
+              <a:rPr lang="zh-CN" altLang="en-US" dirty="0" smtClean="0"/>
+              <a:t>管理</a:t>
+            </a:r>
+            <a:endParaRPr lang="en-US" altLang="zh-CN" dirty="0" smtClean="0"/>
+          </a:p>
+          <a:p>
+            <a:r>
+              <a:rPr lang="en-US" dirty="0"/>
+              <a:t>co</a:t>
+            </a:r>
+            <a:r>
+              <a:rPr lang="zh-CN" altLang="en-US" dirty="0" smtClean="0"/>
+              <a:t>模块 </a:t>
+            </a:r>
+            <a:endParaRPr lang="en-US" altLang="zh-CN" dirty="0" smtClean="0"/>
+          </a:p>
+          <a:p>
+            <a:pPr lvl="1"/>
+            <a:r>
+              <a:rPr lang="en-US" altLang="zh-CN" dirty="0"/>
+              <a:t>co</a:t>
+            </a:r>
+            <a:r>
+              <a:rPr lang="zh-CN" altLang="en-US" dirty="0"/>
+              <a:t>模块其实就是将两种自动执行器（</a:t>
+            </a:r>
+            <a:r>
+              <a:rPr lang="en-US" altLang="zh-CN" dirty="0" err="1"/>
+              <a:t>Thunk</a:t>
+            </a:r>
+            <a:r>
+              <a:rPr lang="zh-CN" altLang="en-US" dirty="0"/>
+              <a:t>函数和</a:t>
+            </a:r>
+            <a:r>
+              <a:rPr lang="en-US" altLang="zh-CN" dirty="0"/>
+              <a:t>Promise</a:t>
+            </a:r>
+            <a:r>
+              <a:rPr lang="zh-CN" altLang="en-US" dirty="0"/>
+              <a:t>对象），包装成一个模块。使用</a:t>
+            </a:r>
+            <a:r>
+              <a:rPr lang="en-US" altLang="zh-CN" dirty="0"/>
+              <a:t>co</a:t>
+            </a:r>
+            <a:r>
+              <a:rPr lang="zh-CN" altLang="en-US" dirty="0"/>
+              <a:t>的前提条件是，</a:t>
+            </a:r>
+            <a:r>
+              <a:rPr lang="en-US" altLang="zh-CN" dirty="0"/>
+              <a:t>Generator</a:t>
+            </a:r>
+            <a:r>
+              <a:rPr lang="zh-CN" altLang="en-US" dirty="0"/>
+              <a:t>函数的</a:t>
+            </a:r>
+            <a:r>
+              <a:rPr lang="en-US" altLang="zh-CN" dirty="0"/>
+              <a:t>yield</a:t>
+            </a:r>
+            <a:r>
+              <a:rPr lang="zh-CN" altLang="en-US" dirty="0"/>
+              <a:t>命令后面，只能是</a:t>
+            </a:r>
+            <a:r>
+              <a:rPr lang="en-US" altLang="zh-CN" dirty="0" err="1"/>
+              <a:t>Thunk</a:t>
+            </a:r>
+            <a:r>
+              <a:rPr lang="zh-CN" altLang="en-US" dirty="0"/>
+              <a:t>函数或</a:t>
+            </a:r>
+            <a:r>
+              <a:rPr lang="en-US" altLang="zh-CN" dirty="0"/>
+              <a:t>Promise</a:t>
+            </a:r>
+            <a:r>
+              <a:rPr lang="zh-CN" altLang="en-US" dirty="0" smtClean="0"/>
+              <a:t>对象</a:t>
+            </a:r>
+            <a:endParaRPr lang="en-US" altLang="zh-CN" dirty="0" smtClean="0"/>
+          </a:p>
+          <a:p>
+            <a:r>
+              <a:rPr lang="en-US" dirty="0" err="1"/>
+              <a:t>async</a:t>
+            </a:r>
+            <a:r>
+              <a:rPr lang="zh-CN" altLang="en-US" dirty="0"/>
+              <a:t>函数</a:t>
+            </a:r>
+            <a:endParaRPr lang="en-US" dirty="0" smtClean="0"/>
+          </a:p>
+          <a:p>
+            <a:endParaRPr lang="en-US" dirty="0"/>
+          </a:p>
+        </p:txBody>
+      </p:sp>
+    </p:spTree>
+    <p:extLst>
+      <p:ext uri="{BB962C8B-B14F-4D97-AF65-F5344CB8AC3E}">
+        <p14:creationId xmlns:p14="http://schemas.microsoft.com/office/powerpoint/2010/main" val="3150609536"/>
+      </p:ext>
+    </p:extLst>
+  </p:cSld>
+  <p:clrMapOvr>
+    <a:masterClrMapping/>
+  </p:clrMapOvr>
+  <p:timing>
+    <p:tnLst>
+      <p:par>
+        <p:cTn id="1" dur="indefinite" restart="never" nodeType="tmRoot"/>
+      </p:par>
+    </p:tnLst>
+  </p:timing>
+</p:sld>
+</file>
+
+<file path=ppt/slides/slide16.xml><?xml version="1.0" encoding="utf-8"?>
+<p:sld xmlns:a="http://schemas.openxmlformats.org/drawingml/2006/main" xmlns:r="http://schemas.openxmlformats.org/officeDocument/2006/relationships" xmlns:p="http://schemas.openxmlformats.org/presentationml/2006/main">
+  <p:cSld>
+    <p:spTree>
+      <p:nvGrpSpPr>
+        <p:cNvPr id="1" name=""/>
+        <p:cNvGrpSpPr/>
+        <p:nvPr/>
+      </p:nvGrpSpPr>
+      <p:grpSpPr>
+        <a:xfrm>
+          <a:off x="0" y="0"/>
+          <a:ext cx="0" cy="0"/>
+          <a:chOff x="0" y="0"/>
+          <a:chExt cx="0" cy="0"/>
+        </a:xfrm>
+      </p:grpSpPr>
+      <p:sp>
+        <p:nvSpPr>
+          <p:cNvPr id="2" name="标题 1"/>
+          <p:cNvSpPr>
+            <a:spLocks noGrp="1"/>
+          </p:cNvSpPr>
+          <p:nvPr>
+            <p:ph type="title"/>
+          </p:nvPr>
+        </p:nvSpPr>
+        <p:spPr/>
+        <p:txBody>
+          <a:bodyPr/>
+          <a:lstStyle/>
+          <a:p>
+            <a:r>
+              <a:rPr lang="en-US" dirty="0" smtClean="0"/>
+              <a:t>19 </a:t>
+            </a:r>
+            <a:r>
+              <a:rPr lang="en-US" altLang="zh-CN" dirty="0"/>
+              <a:t>Module</a:t>
+            </a:r>
+            <a:endParaRPr lang="en-US" dirty="0"/>
+          </a:p>
+        </p:txBody>
+      </p:sp>
+      <p:sp>
+        <p:nvSpPr>
+          <p:cNvPr id="3" name="内容占位符 2"/>
+          <p:cNvSpPr>
+            <a:spLocks noGrp="1"/>
+          </p:cNvSpPr>
+          <p:nvPr>
+            <p:ph idx="1"/>
+          </p:nvPr>
+        </p:nvSpPr>
+        <p:spPr/>
+        <p:txBody>
+          <a:bodyPr/>
+          <a:lstStyle/>
+          <a:p>
+            <a:r>
+              <a:rPr lang="zh-CN" altLang="en-US" dirty="0"/>
+              <a:t>严格</a:t>
+            </a:r>
+            <a:r>
+              <a:rPr lang="zh-CN" altLang="en-US" dirty="0" smtClean="0"/>
+              <a:t>模式</a:t>
+            </a:r>
+            <a:endParaRPr lang="en-US" altLang="zh-CN" dirty="0" smtClean="0"/>
+          </a:p>
+          <a:p>
+            <a:r>
+              <a:rPr lang="en-US" dirty="0"/>
+              <a:t>export</a:t>
+            </a:r>
+            <a:r>
+              <a:rPr lang="zh-CN" altLang="en-US" dirty="0" smtClean="0"/>
+              <a:t>命令</a:t>
+            </a:r>
+            <a:endParaRPr lang="en-US" altLang="zh-CN" dirty="0" smtClean="0"/>
+          </a:p>
+          <a:p>
+            <a:r>
+              <a:rPr lang="en-US" dirty="0"/>
+              <a:t>import</a:t>
+            </a:r>
+            <a:r>
+              <a:rPr lang="zh-CN" altLang="en-US" dirty="0" smtClean="0"/>
+              <a:t>命令</a:t>
+            </a:r>
+            <a:endParaRPr lang="en-US" altLang="zh-CN" dirty="0" smtClean="0"/>
+          </a:p>
+          <a:p>
+            <a:r>
+              <a:rPr lang="zh-CN" altLang="en-US" dirty="0"/>
+              <a:t>模块的整体</a:t>
+            </a:r>
+            <a:r>
+              <a:rPr lang="zh-CN" altLang="en-US" dirty="0" smtClean="0"/>
+              <a:t>加载</a:t>
+            </a:r>
+            <a:endParaRPr lang="en-US" altLang="zh-CN" dirty="0" smtClean="0"/>
+          </a:p>
+          <a:p>
+            <a:r>
+              <a:rPr lang="en-US" dirty="0"/>
+              <a:t>export default</a:t>
+            </a:r>
+            <a:r>
+              <a:rPr lang="zh-CN" altLang="en-US" dirty="0" smtClean="0"/>
+              <a:t>命令</a:t>
+            </a:r>
+            <a:endParaRPr lang="en-US" altLang="zh-CN" dirty="0" smtClean="0"/>
+          </a:p>
+          <a:p>
+            <a:r>
+              <a:rPr lang="zh-CN" altLang="en-US" dirty="0"/>
+              <a:t>模块的</a:t>
+            </a:r>
+            <a:r>
+              <a:rPr lang="zh-CN" altLang="en-US" dirty="0" smtClean="0"/>
+              <a:t>继承</a:t>
+            </a:r>
+            <a:endParaRPr lang="en-US" altLang="zh-CN" dirty="0" smtClean="0"/>
+          </a:p>
+          <a:p>
+            <a:r>
+              <a:rPr lang="en-US" altLang="zh-CN" dirty="0"/>
+              <a:t>ES6</a:t>
+            </a:r>
+            <a:r>
+              <a:rPr lang="zh-CN" altLang="en-US" dirty="0"/>
+              <a:t>模块加载的实质</a:t>
+            </a:r>
+            <a:endParaRPr lang="en-US" dirty="0"/>
+          </a:p>
+        </p:txBody>
+      </p:sp>
+    </p:spTree>
+    <p:extLst>
+      <p:ext uri="{BB962C8B-B14F-4D97-AF65-F5344CB8AC3E}">
+        <p14:creationId xmlns:p14="http://schemas.microsoft.com/office/powerpoint/2010/main" val="2838492186"/>
+      </p:ext>
+    </p:extLst>
+  </p:cSld>
+  <p:clrMapOvr>
+    <a:masterClrMapping/>
+  </p:clrMapOvr>
+  <p:timing>
+    <p:tnLst>
+      <p:par>
+        <p:cTn id="1" dur="indefinite" restart="never" nodeType="tmRoot"/>
+      </p:par>
+    </p:tnLst>
+  </p:timing>
+</p:sld>
+</file>
+
+<file path=ppt/slides/slide17.xml><?xml version="1.0" encoding="utf-8"?>
 <p:sld xmlns:a="http://schemas.openxmlformats.org/drawingml/2006/main" xmlns:r="http://schemas.openxmlformats.org/officeDocument/2006/relationships" xmlns:p="http://schemas.openxmlformats.org/presentationml/2006/main">
   <p:cSld>
     <p:spTree>
@@ -8474,7 +8969,11 @@
           <a:p>
             <a:r>
               <a:rPr lang="en-US" dirty="0" smtClean="0"/>
-              <a:t>9. </a:t>
+              <a:t>9</a:t>
+            </a:r>
+            <a:r>
+              <a:rPr lang="en-US" dirty="0" smtClean="0"/>
+              <a:t>. </a:t>
             </a:r>
             <a:r>
               <a:rPr lang="zh-CN" altLang="en-US" dirty="0" smtClean="0"/>
@@ -9180,19 +9679,7 @@
           <a:p>
             <a:r>
               <a:rPr lang="zh-CN" altLang="en-US" dirty="0" smtClean="0"/>
-              <a:t>面向工程化，解决安全性和</a:t>
-            </a:r>
-            <a:r>
-              <a:rPr lang="zh-CN" altLang="en-US" dirty="0" smtClean="0"/>
-              <a:t>精度上</a:t>
-            </a:r>
-            <a:r>
-              <a:rPr lang="zh-CN" altLang="en-US" dirty="0" smtClean="0"/>
-              <a:t>的</a:t>
-            </a:r>
-            <a:r>
-              <a:rPr lang="zh-CN" altLang="en-US" dirty="0" smtClean="0"/>
-              <a:t>问题，使用时现查</a:t>
+              <a:t>面向工程化，解决安全性和精度上的问题，使用时现查</a:t>
             </a:r>
             <a:endParaRPr lang="en-US" dirty="0"/>
           </a:p>

</xml_diff>